<commit_message>
Updated Chart. Removed other phase 1.
</commit_message>
<xml_diff>
--- a/HyPeerWeb/Pert-Gantt Chart.pptx
+++ b/HyPeerWeb/Pert-Gantt Chart.pptx
@@ -7,6 +7,7 @@
   <p:sldIdLst>
     <p:sldId id="256" r:id="rId2"/>
     <p:sldId id="257" r:id="rId3"/>
+    <p:sldId id="258" r:id="rId4"/>
   </p:sldIdLst>
   <p:sldSz cx="9144000" cy="6858000" type="screen4x3"/>
   <p:notesSz cx="6858000" cy="9144000"/>
@@ -289,7 +290,7 @@
           <a:p>
             <a:fld id="{5FF0257F-C6B7-4A5D-B48D-76E7EC426D96}" type="datetimeFigureOut">
               <a:rPr lang="en-US" smtClean="0"/>
-              <a:t>10/16/2012</a:t>
+              <a:t>10/30/2012</a:t>
             </a:fld>
             <a:endParaRPr lang="en-US"/>
           </a:p>
@@ -459,7 +460,7 @@
           <a:p>
             <a:fld id="{5FF0257F-C6B7-4A5D-B48D-76E7EC426D96}" type="datetimeFigureOut">
               <a:rPr lang="en-US" smtClean="0"/>
-              <a:t>10/16/2012</a:t>
+              <a:t>10/30/2012</a:t>
             </a:fld>
             <a:endParaRPr lang="en-US"/>
           </a:p>
@@ -639,7 +640,7 @@
           <a:p>
             <a:fld id="{5FF0257F-C6B7-4A5D-B48D-76E7EC426D96}" type="datetimeFigureOut">
               <a:rPr lang="en-US" smtClean="0"/>
-              <a:t>10/16/2012</a:t>
+              <a:t>10/30/2012</a:t>
             </a:fld>
             <a:endParaRPr lang="en-US"/>
           </a:p>
@@ -809,7 +810,7 @@
           <a:p>
             <a:fld id="{5FF0257F-C6B7-4A5D-B48D-76E7EC426D96}" type="datetimeFigureOut">
               <a:rPr lang="en-US" smtClean="0"/>
-              <a:t>10/16/2012</a:t>
+              <a:t>10/30/2012</a:t>
             </a:fld>
             <a:endParaRPr lang="en-US"/>
           </a:p>
@@ -1055,7 +1056,7 @@
           <a:p>
             <a:fld id="{5FF0257F-C6B7-4A5D-B48D-76E7EC426D96}" type="datetimeFigureOut">
               <a:rPr lang="en-US" smtClean="0"/>
-              <a:t>10/16/2012</a:t>
+              <a:t>10/30/2012</a:t>
             </a:fld>
             <a:endParaRPr lang="en-US"/>
           </a:p>
@@ -1343,7 +1344,7 @@
           <a:p>
             <a:fld id="{5FF0257F-C6B7-4A5D-B48D-76E7EC426D96}" type="datetimeFigureOut">
               <a:rPr lang="en-US" smtClean="0"/>
-              <a:t>10/16/2012</a:t>
+              <a:t>10/30/2012</a:t>
             </a:fld>
             <a:endParaRPr lang="en-US"/>
           </a:p>
@@ -1765,7 +1766,7 @@
           <a:p>
             <a:fld id="{5FF0257F-C6B7-4A5D-B48D-76E7EC426D96}" type="datetimeFigureOut">
               <a:rPr lang="en-US" smtClean="0"/>
-              <a:t>10/16/2012</a:t>
+              <a:t>10/30/2012</a:t>
             </a:fld>
             <a:endParaRPr lang="en-US"/>
           </a:p>
@@ -1883,7 +1884,7 @@
           <a:p>
             <a:fld id="{5FF0257F-C6B7-4A5D-B48D-76E7EC426D96}" type="datetimeFigureOut">
               <a:rPr lang="en-US" smtClean="0"/>
-              <a:t>10/16/2012</a:t>
+              <a:t>10/30/2012</a:t>
             </a:fld>
             <a:endParaRPr lang="en-US"/>
           </a:p>
@@ -1978,7 +1979,7 @@
           <a:p>
             <a:fld id="{5FF0257F-C6B7-4A5D-B48D-76E7EC426D96}" type="datetimeFigureOut">
               <a:rPr lang="en-US" smtClean="0"/>
-              <a:t>10/16/2012</a:t>
+              <a:t>10/30/2012</a:t>
             </a:fld>
             <a:endParaRPr lang="en-US"/>
           </a:p>
@@ -2255,7 +2256,7 @@
           <a:p>
             <a:fld id="{5FF0257F-C6B7-4A5D-B48D-76E7EC426D96}" type="datetimeFigureOut">
               <a:rPr lang="en-US" smtClean="0"/>
-              <a:t>10/16/2012</a:t>
+              <a:t>10/30/2012</a:t>
             </a:fld>
             <a:endParaRPr lang="en-US"/>
           </a:p>
@@ -2508,7 +2509,7 @@
           <a:p>
             <a:fld id="{5FF0257F-C6B7-4A5D-B48D-76E7EC426D96}" type="datetimeFigureOut">
               <a:rPr lang="en-US" smtClean="0"/>
-              <a:t>10/16/2012</a:t>
+              <a:t>10/30/2012</a:t>
             </a:fld>
             <a:endParaRPr lang="en-US"/>
           </a:p>
@@ -2721,7 +2722,7 @@
           <a:p>
             <a:fld id="{5FF0257F-C6B7-4A5D-B48D-76E7EC426D96}" type="datetimeFigureOut">
               <a:rPr lang="en-US" smtClean="0"/>
-              <a:t>10/16/2012</a:t>
+              <a:t>10/30/2012</a:t>
             </a:fld>
             <a:endParaRPr lang="en-US"/>
           </a:p>
@@ -4480,6 +4481,1029 @@
 </p:sld>
 </file>
 
+<file path=ppt/slides/slide3.xml><?xml version="1.0" encoding="utf-8"?>
+<p:sld xmlns:a="http://schemas.openxmlformats.org/drawingml/2006/main" xmlns:r="http://schemas.openxmlformats.org/officeDocument/2006/relationships" xmlns:p="http://schemas.openxmlformats.org/presentationml/2006/main">
+  <p:cSld>
+    <p:spTree>
+      <p:nvGrpSpPr>
+        <p:cNvPr id="1" name=""/>
+        <p:cNvGrpSpPr/>
+        <p:nvPr/>
+      </p:nvGrpSpPr>
+      <p:grpSpPr>
+        <a:xfrm>
+          <a:off x="0" y="0"/>
+          <a:ext cx="0" cy="0"/>
+          <a:chOff x="0" y="0"/>
+          <a:chExt cx="0" cy="0"/>
+        </a:xfrm>
+      </p:grpSpPr>
+      <p:sp>
+        <p:nvSpPr>
+          <p:cNvPr id="2" name="Rectangle 1"/>
+          <p:cNvSpPr/>
+          <p:nvPr/>
+        </p:nvSpPr>
+        <p:spPr>
+          <a:xfrm>
+            <a:off x="381000" y="381000"/>
+            <a:ext cx="1905000" cy="1447800"/>
+          </a:xfrm>
+          <a:prstGeom prst="rect">
+            <a:avLst/>
+          </a:prstGeom>
+        </p:spPr>
+        <p:style>
+          <a:lnRef idx="2">
+            <a:schemeClr val="accent1">
+              <a:shade val="50000"/>
+            </a:schemeClr>
+          </a:lnRef>
+          <a:fillRef idx="1">
+            <a:schemeClr val="accent1"/>
+          </a:fillRef>
+          <a:effectRef idx="0">
+            <a:schemeClr val="accent1"/>
+          </a:effectRef>
+          <a:fontRef idx="minor">
+            <a:schemeClr val="lt1"/>
+          </a:fontRef>
+        </p:style>
+        <p:txBody>
+          <a:bodyPr rtlCol="0" anchor="ctr"/>
+          <a:lstStyle/>
+          <a:p>
+            <a:pPr algn="ctr"/>
+            <a:r>
+              <a:rPr lang="en-US" dirty="0" smtClean="0"/>
+              <a:t>Database Tests</a:t>
+            </a:r>
+          </a:p>
+          <a:p>
+            <a:pPr marL="285750" indent="-285750">
+              <a:buFont typeface="Arial" pitchFamily="34" charset="0"/>
+              <a:buChar char="•"/>
+            </a:pPr>
+            <a:r>
+              <a:rPr lang="en-US" dirty="0" smtClean="0"/>
+              <a:t>Trevor</a:t>
+            </a:r>
+          </a:p>
+          <a:p>
+            <a:pPr marL="285750" indent="-285750">
+              <a:buFont typeface="Arial" pitchFamily="34" charset="0"/>
+              <a:buChar char="•"/>
+            </a:pPr>
+            <a:r>
+              <a:rPr lang="en-US" dirty="0" smtClean="0"/>
+              <a:t>Start: 10/17</a:t>
+            </a:r>
+          </a:p>
+          <a:p>
+            <a:pPr marL="285750" indent="-285750">
+              <a:buFont typeface="Arial" pitchFamily="34" charset="0"/>
+              <a:buChar char="•"/>
+            </a:pPr>
+            <a:r>
+              <a:rPr lang="en-US" dirty="0" smtClean="0"/>
+              <a:t>Planned: 10/30</a:t>
+            </a:r>
+          </a:p>
+          <a:p>
+            <a:pPr marL="285750" indent="-285750">
+              <a:buFont typeface="Arial" pitchFamily="34" charset="0"/>
+              <a:buChar char="•"/>
+            </a:pPr>
+            <a:r>
+              <a:rPr lang="en-US" dirty="0" smtClean="0"/>
+              <a:t>Actual: 10/23</a:t>
+            </a:r>
+            <a:endParaRPr lang="en-US" dirty="0"/>
+          </a:p>
+        </p:txBody>
+      </p:sp>
+      <p:sp>
+        <p:nvSpPr>
+          <p:cNvPr id="3" name="Rectangle 2"/>
+          <p:cNvSpPr/>
+          <p:nvPr/>
+        </p:nvSpPr>
+        <p:spPr>
+          <a:xfrm>
+            <a:off x="6858000" y="381000"/>
+            <a:ext cx="1905000" cy="1447800"/>
+          </a:xfrm>
+          <a:prstGeom prst="rect">
+            <a:avLst/>
+          </a:prstGeom>
+        </p:spPr>
+        <p:style>
+          <a:lnRef idx="2">
+            <a:schemeClr val="accent1">
+              <a:shade val="50000"/>
+            </a:schemeClr>
+          </a:lnRef>
+          <a:fillRef idx="1">
+            <a:schemeClr val="accent1"/>
+          </a:fillRef>
+          <a:effectRef idx="0">
+            <a:schemeClr val="accent1"/>
+          </a:effectRef>
+          <a:fontRef idx="minor">
+            <a:schemeClr val="lt1"/>
+          </a:fontRef>
+        </p:style>
+        <p:txBody>
+          <a:bodyPr rtlCol="0" anchor="ctr"/>
+          <a:lstStyle/>
+          <a:p>
+            <a:pPr algn="ctr"/>
+            <a:r>
+              <a:rPr lang="en-US" dirty="0" err="1" smtClean="0"/>
+              <a:t>HyPeerWeb</a:t>
+            </a:r>
+            <a:r>
+              <a:rPr lang="en-US" dirty="0" smtClean="0"/>
+              <a:t> Tests</a:t>
+            </a:r>
+          </a:p>
+          <a:p>
+            <a:pPr marL="285750" indent="-285750">
+              <a:buFont typeface="Arial" pitchFamily="34" charset="0"/>
+              <a:buChar char="•"/>
+            </a:pPr>
+            <a:r>
+              <a:rPr lang="en-US" dirty="0" smtClean="0"/>
+              <a:t>Matthew</a:t>
+            </a:r>
+          </a:p>
+          <a:p>
+            <a:pPr marL="285750" indent="-285750">
+              <a:buFont typeface="Arial" pitchFamily="34" charset="0"/>
+              <a:buChar char="•"/>
+            </a:pPr>
+            <a:r>
+              <a:rPr lang="en-US" dirty="0" smtClean="0"/>
+              <a:t>Start: 10/17</a:t>
+            </a:r>
+          </a:p>
+          <a:p>
+            <a:pPr marL="285750" indent="-285750">
+              <a:buFont typeface="Arial" pitchFamily="34" charset="0"/>
+              <a:buChar char="•"/>
+            </a:pPr>
+            <a:r>
+              <a:rPr lang="en-US" dirty="0" smtClean="0"/>
+              <a:t>Planned: 10/30</a:t>
+            </a:r>
+          </a:p>
+          <a:p>
+            <a:pPr marL="285750" indent="-285750">
+              <a:buFont typeface="Arial" pitchFamily="34" charset="0"/>
+              <a:buChar char="•"/>
+            </a:pPr>
+            <a:r>
+              <a:rPr lang="en-US" dirty="0" smtClean="0"/>
+              <a:t>Actual: 10/30</a:t>
+            </a:r>
+            <a:endParaRPr lang="en-US" dirty="0"/>
+          </a:p>
+        </p:txBody>
+      </p:sp>
+      <p:sp>
+        <p:nvSpPr>
+          <p:cNvPr id="4" name="Rectangle 3"/>
+          <p:cNvSpPr/>
+          <p:nvPr/>
+        </p:nvSpPr>
+        <p:spPr>
+          <a:xfrm>
+            <a:off x="3271911" y="3124200"/>
+            <a:ext cx="2133600" cy="1447800"/>
+          </a:xfrm>
+          <a:prstGeom prst="rect">
+            <a:avLst/>
+          </a:prstGeom>
+        </p:spPr>
+        <p:style>
+          <a:lnRef idx="2">
+            <a:schemeClr val="accent1">
+              <a:shade val="50000"/>
+            </a:schemeClr>
+          </a:lnRef>
+          <a:fillRef idx="1">
+            <a:schemeClr val="accent1"/>
+          </a:fillRef>
+          <a:effectRef idx="0">
+            <a:schemeClr val="accent1"/>
+          </a:effectRef>
+          <a:fontRef idx="minor">
+            <a:schemeClr val="lt1"/>
+          </a:fontRef>
+        </p:style>
+        <p:txBody>
+          <a:bodyPr rtlCol="0" anchor="ctr"/>
+          <a:lstStyle/>
+          <a:p>
+            <a:pPr algn="ctr"/>
+            <a:r>
+              <a:rPr lang="en-US" dirty="0" smtClean="0"/>
+              <a:t>Visitor Tests</a:t>
+            </a:r>
+          </a:p>
+          <a:p>
+            <a:pPr marL="285750" indent="-285750">
+              <a:buFont typeface="Arial" pitchFamily="34" charset="0"/>
+              <a:buChar char="•"/>
+            </a:pPr>
+            <a:r>
+              <a:rPr lang="en-US" dirty="0" err="1" smtClean="0"/>
+              <a:t>Konrad</a:t>
+            </a:r>
+            <a:endParaRPr lang="en-US" dirty="0" smtClean="0"/>
+          </a:p>
+          <a:p>
+            <a:pPr marL="285750" indent="-285750">
+              <a:buFont typeface="Arial" pitchFamily="34" charset="0"/>
+              <a:buChar char="•"/>
+            </a:pPr>
+            <a:r>
+              <a:rPr lang="en-US" dirty="0" smtClean="0"/>
+              <a:t>Start: 10/17</a:t>
+            </a:r>
+          </a:p>
+          <a:p>
+            <a:pPr marL="285750" indent="-285750">
+              <a:buFont typeface="Arial" pitchFamily="34" charset="0"/>
+              <a:buChar char="•"/>
+            </a:pPr>
+            <a:r>
+              <a:rPr lang="en-US" dirty="0" smtClean="0"/>
+              <a:t>Planned: 10/30</a:t>
+            </a:r>
+          </a:p>
+          <a:p>
+            <a:pPr marL="285750" indent="-285750">
+              <a:buFont typeface="Arial" pitchFamily="34" charset="0"/>
+              <a:buChar char="•"/>
+            </a:pPr>
+            <a:r>
+              <a:rPr lang="en-US" dirty="0" smtClean="0"/>
+              <a:t>Actual: 10/30</a:t>
+            </a:r>
+            <a:endParaRPr lang="en-US" dirty="0"/>
+          </a:p>
+        </p:txBody>
+      </p:sp>
+      <p:sp>
+        <p:nvSpPr>
+          <p:cNvPr id="5" name="Rectangle 4"/>
+          <p:cNvSpPr/>
+          <p:nvPr/>
+        </p:nvSpPr>
+        <p:spPr>
+          <a:xfrm>
+            <a:off x="2514600" y="381000"/>
+            <a:ext cx="1912034" cy="1447800"/>
+          </a:xfrm>
+          <a:prstGeom prst="rect">
+            <a:avLst/>
+          </a:prstGeom>
+        </p:spPr>
+        <p:style>
+          <a:lnRef idx="2">
+            <a:schemeClr val="accent1">
+              <a:shade val="50000"/>
+            </a:schemeClr>
+          </a:lnRef>
+          <a:fillRef idx="1">
+            <a:schemeClr val="accent1"/>
+          </a:fillRef>
+          <a:effectRef idx="0">
+            <a:schemeClr val="accent1"/>
+          </a:effectRef>
+          <a:fontRef idx="minor">
+            <a:schemeClr val="lt1"/>
+          </a:fontRef>
+        </p:style>
+        <p:txBody>
+          <a:bodyPr rtlCol="0" anchor="ctr"/>
+          <a:lstStyle/>
+          <a:p>
+            <a:pPr algn="ctr"/>
+            <a:r>
+              <a:rPr lang="en-US" dirty="0" smtClean="0"/>
+              <a:t>Node Tests 1</a:t>
+            </a:r>
+          </a:p>
+          <a:p>
+            <a:pPr marL="285750" indent="-285750">
+              <a:buFont typeface="Arial" pitchFamily="34" charset="0"/>
+              <a:buChar char="•"/>
+            </a:pPr>
+            <a:r>
+              <a:rPr lang="en-US" dirty="0" err="1" smtClean="0"/>
+              <a:t>Huy</a:t>
+            </a:r>
+            <a:endParaRPr lang="en-US" dirty="0" smtClean="0"/>
+          </a:p>
+          <a:p>
+            <a:pPr marL="285750" indent="-285750">
+              <a:buFont typeface="Arial" pitchFamily="34" charset="0"/>
+              <a:buChar char="•"/>
+            </a:pPr>
+            <a:r>
+              <a:rPr lang="en-US" dirty="0" smtClean="0"/>
+              <a:t>Start: 10/17</a:t>
+            </a:r>
+          </a:p>
+          <a:p>
+            <a:pPr marL="285750" indent="-285750">
+              <a:buFont typeface="Arial" pitchFamily="34" charset="0"/>
+              <a:buChar char="•"/>
+            </a:pPr>
+            <a:r>
+              <a:rPr lang="en-US" dirty="0" smtClean="0"/>
+              <a:t>Planned: 10/30</a:t>
+            </a:r>
+          </a:p>
+          <a:p>
+            <a:pPr marL="285750" indent="-285750">
+              <a:buFont typeface="Arial" pitchFamily="34" charset="0"/>
+              <a:buChar char="•"/>
+            </a:pPr>
+            <a:r>
+              <a:rPr lang="en-US" dirty="0" smtClean="0"/>
+              <a:t>Actual: 10/30</a:t>
+            </a:r>
+            <a:endParaRPr lang="en-US" dirty="0"/>
+          </a:p>
+        </p:txBody>
+      </p:sp>
+      <p:sp>
+        <p:nvSpPr>
+          <p:cNvPr id="6" name="Rectangle 5"/>
+          <p:cNvSpPr/>
+          <p:nvPr/>
+        </p:nvSpPr>
+        <p:spPr>
+          <a:xfrm>
+            <a:off x="4648200" y="381000"/>
+            <a:ext cx="1981200" cy="1447800"/>
+          </a:xfrm>
+          <a:prstGeom prst="rect">
+            <a:avLst/>
+          </a:prstGeom>
+        </p:spPr>
+        <p:style>
+          <a:lnRef idx="2">
+            <a:schemeClr val="accent1">
+              <a:shade val="50000"/>
+            </a:schemeClr>
+          </a:lnRef>
+          <a:fillRef idx="1">
+            <a:schemeClr val="accent1"/>
+          </a:fillRef>
+          <a:effectRef idx="0">
+            <a:schemeClr val="accent1"/>
+          </a:effectRef>
+          <a:fontRef idx="minor">
+            <a:schemeClr val="lt1"/>
+          </a:fontRef>
+        </p:style>
+        <p:txBody>
+          <a:bodyPr rtlCol="0" anchor="ctr"/>
+          <a:lstStyle/>
+          <a:p>
+            <a:pPr algn="ctr"/>
+            <a:r>
+              <a:rPr lang="en-US" dirty="0" smtClean="0"/>
+              <a:t>Node Tests 2</a:t>
+            </a:r>
+          </a:p>
+          <a:p>
+            <a:pPr marL="285750" indent="-285750">
+              <a:buFont typeface="Arial" pitchFamily="34" charset="0"/>
+              <a:buChar char="•"/>
+            </a:pPr>
+            <a:r>
+              <a:rPr lang="en-US" dirty="0" smtClean="0"/>
+              <a:t>Brian</a:t>
+            </a:r>
+          </a:p>
+          <a:p>
+            <a:pPr marL="285750" indent="-285750">
+              <a:buFont typeface="Arial" pitchFamily="34" charset="0"/>
+              <a:buChar char="•"/>
+            </a:pPr>
+            <a:r>
+              <a:rPr lang="en-US" dirty="0" smtClean="0"/>
+              <a:t>Start: 10/17</a:t>
+            </a:r>
+          </a:p>
+          <a:p>
+            <a:pPr marL="285750" indent="-285750">
+              <a:buFont typeface="Arial" pitchFamily="34" charset="0"/>
+              <a:buChar char="•"/>
+            </a:pPr>
+            <a:r>
+              <a:rPr lang="en-US" dirty="0" smtClean="0"/>
+              <a:t>Planned: 10/30</a:t>
+            </a:r>
+          </a:p>
+          <a:p>
+            <a:pPr marL="285750" indent="-285750">
+              <a:buFont typeface="Arial" pitchFamily="34" charset="0"/>
+              <a:buChar char="•"/>
+            </a:pPr>
+            <a:r>
+              <a:rPr lang="en-US" dirty="0" smtClean="0"/>
+              <a:t>Actual: 10/29</a:t>
+            </a:r>
+            <a:endParaRPr lang="en-US" dirty="0"/>
+          </a:p>
+        </p:txBody>
+      </p:sp>
+      <p:sp>
+        <p:nvSpPr>
+          <p:cNvPr id="7" name="Rectangle 6"/>
+          <p:cNvSpPr/>
+          <p:nvPr/>
+        </p:nvSpPr>
+        <p:spPr>
+          <a:xfrm>
+            <a:off x="381000" y="5029200"/>
+            <a:ext cx="2133600" cy="1447800"/>
+          </a:xfrm>
+          <a:prstGeom prst="rect">
+            <a:avLst/>
+          </a:prstGeom>
+        </p:spPr>
+        <p:style>
+          <a:lnRef idx="2">
+            <a:schemeClr val="accent1">
+              <a:shade val="50000"/>
+            </a:schemeClr>
+          </a:lnRef>
+          <a:fillRef idx="1">
+            <a:schemeClr val="accent1"/>
+          </a:fillRef>
+          <a:effectRef idx="0">
+            <a:schemeClr val="accent1"/>
+          </a:effectRef>
+          <a:fontRef idx="minor">
+            <a:schemeClr val="lt1"/>
+          </a:fontRef>
+        </p:style>
+        <p:txBody>
+          <a:bodyPr rtlCol="0" anchor="ctr"/>
+          <a:lstStyle/>
+          <a:p>
+            <a:pPr algn="ctr"/>
+            <a:r>
+              <a:rPr lang="en-US" dirty="0" smtClean="0"/>
+              <a:t>Setup Visitor Pattern</a:t>
+            </a:r>
+          </a:p>
+          <a:p>
+            <a:pPr marL="285750" indent="-285750">
+              <a:buFont typeface="Arial" pitchFamily="34" charset="0"/>
+              <a:buChar char="•"/>
+            </a:pPr>
+            <a:r>
+              <a:rPr lang="en-US" dirty="0" smtClean="0"/>
+              <a:t>Matthew</a:t>
+            </a:r>
+          </a:p>
+          <a:p>
+            <a:pPr marL="285750" indent="-285750">
+              <a:buFont typeface="Arial" pitchFamily="34" charset="0"/>
+              <a:buChar char="•"/>
+            </a:pPr>
+            <a:r>
+              <a:rPr lang="en-US" dirty="0" smtClean="0"/>
+              <a:t>Start: 10/17</a:t>
+            </a:r>
+          </a:p>
+          <a:p>
+            <a:pPr marL="285750" indent="-285750">
+              <a:buFont typeface="Arial" pitchFamily="34" charset="0"/>
+              <a:buChar char="•"/>
+            </a:pPr>
+            <a:r>
+              <a:rPr lang="en-US" dirty="0" smtClean="0"/>
+              <a:t>Planned: 10/30</a:t>
+            </a:r>
+          </a:p>
+          <a:p>
+            <a:pPr marL="285750" indent="-285750">
+              <a:buFont typeface="Arial" pitchFamily="34" charset="0"/>
+              <a:buChar char="•"/>
+            </a:pPr>
+            <a:r>
+              <a:rPr lang="en-US" dirty="0" smtClean="0"/>
+              <a:t>Actual: 10/27</a:t>
+            </a:r>
+            <a:endParaRPr lang="en-US" dirty="0"/>
+          </a:p>
+        </p:txBody>
+      </p:sp>
+      <p:sp>
+        <p:nvSpPr>
+          <p:cNvPr id="8" name="Rectangle 7"/>
+          <p:cNvSpPr/>
+          <p:nvPr/>
+        </p:nvSpPr>
+        <p:spPr>
+          <a:xfrm>
+            <a:off x="3276600" y="5036234"/>
+            <a:ext cx="2133600" cy="1447800"/>
+          </a:xfrm>
+          <a:prstGeom prst="rect">
+            <a:avLst/>
+          </a:prstGeom>
+        </p:spPr>
+        <p:style>
+          <a:lnRef idx="2">
+            <a:schemeClr val="accent1">
+              <a:shade val="50000"/>
+            </a:schemeClr>
+          </a:lnRef>
+          <a:fillRef idx="1">
+            <a:schemeClr val="accent1"/>
+          </a:fillRef>
+          <a:effectRef idx="0">
+            <a:schemeClr val="accent1"/>
+          </a:effectRef>
+          <a:fontRef idx="minor">
+            <a:schemeClr val="lt1"/>
+          </a:fontRef>
+        </p:style>
+        <p:txBody>
+          <a:bodyPr rtlCol="0" anchor="ctr"/>
+          <a:lstStyle/>
+          <a:p>
+            <a:pPr algn="ctr"/>
+            <a:r>
+              <a:rPr lang="en-US" dirty="0" smtClean="0"/>
+              <a:t>Finish Visitor Pattern</a:t>
+            </a:r>
+          </a:p>
+          <a:p>
+            <a:pPr marL="285750" indent="-285750">
+              <a:buFont typeface="Arial" pitchFamily="34" charset="0"/>
+              <a:buChar char="•"/>
+            </a:pPr>
+            <a:r>
+              <a:rPr lang="en-US" dirty="0" err="1" smtClean="0"/>
+              <a:t>Konrad</a:t>
+            </a:r>
+            <a:endParaRPr lang="en-US" dirty="0" smtClean="0"/>
+          </a:p>
+          <a:p>
+            <a:pPr marL="285750" indent="-285750">
+              <a:buFont typeface="Arial" pitchFamily="34" charset="0"/>
+              <a:buChar char="•"/>
+            </a:pPr>
+            <a:r>
+              <a:rPr lang="en-US" dirty="0" smtClean="0"/>
+              <a:t>Start: 10/17</a:t>
+            </a:r>
+          </a:p>
+          <a:p>
+            <a:pPr marL="285750" indent="-285750">
+              <a:buFont typeface="Arial" pitchFamily="34" charset="0"/>
+              <a:buChar char="•"/>
+            </a:pPr>
+            <a:r>
+              <a:rPr lang="en-US" dirty="0" smtClean="0"/>
+              <a:t>Planned: 10/30</a:t>
+            </a:r>
+          </a:p>
+          <a:p>
+            <a:pPr marL="285750" indent="-285750">
+              <a:buFont typeface="Arial" pitchFamily="34" charset="0"/>
+              <a:buChar char="•"/>
+            </a:pPr>
+            <a:r>
+              <a:rPr lang="en-US" dirty="0" smtClean="0"/>
+              <a:t>Actual: 10/27</a:t>
+            </a:r>
+            <a:endParaRPr lang="en-US" dirty="0"/>
+          </a:p>
+        </p:txBody>
+      </p:sp>
+      <p:sp>
+        <p:nvSpPr>
+          <p:cNvPr id="9" name="Rectangle 8"/>
+          <p:cNvSpPr/>
+          <p:nvPr/>
+        </p:nvSpPr>
+        <p:spPr>
+          <a:xfrm>
+            <a:off x="6019800" y="3124200"/>
+            <a:ext cx="2133600" cy="1447800"/>
+          </a:xfrm>
+          <a:prstGeom prst="rect">
+            <a:avLst/>
+          </a:prstGeom>
+        </p:spPr>
+        <p:style>
+          <a:lnRef idx="2">
+            <a:schemeClr val="accent1">
+              <a:shade val="50000"/>
+            </a:schemeClr>
+          </a:lnRef>
+          <a:fillRef idx="1">
+            <a:schemeClr val="accent1"/>
+          </a:fillRef>
+          <a:effectRef idx="0">
+            <a:schemeClr val="accent1"/>
+          </a:effectRef>
+          <a:fontRef idx="minor">
+            <a:schemeClr val="lt1"/>
+          </a:fontRef>
+        </p:style>
+        <p:txBody>
+          <a:bodyPr rtlCol="0" anchor="ctr"/>
+          <a:lstStyle/>
+          <a:p>
+            <a:pPr algn="ctr"/>
+            <a:r>
+              <a:rPr lang="en-US" dirty="0" smtClean="0"/>
+              <a:t>Review</a:t>
+            </a:r>
+          </a:p>
+          <a:p>
+            <a:pPr marL="285750" indent="-285750">
+              <a:buFont typeface="Arial" pitchFamily="34" charset="0"/>
+              <a:buChar char="•"/>
+            </a:pPr>
+            <a:r>
+              <a:rPr lang="en-US" dirty="0" smtClean="0"/>
+              <a:t>Brian, Matthew</a:t>
+            </a:r>
+          </a:p>
+          <a:p>
+            <a:pPr marL="285750" indent="-285750">
+              <a:buFont typeface="Arial" pitchFamily="34" charset="0"/>
+              <a:buChar char="•"/>
+            </a:pPr>
+            <a:r>
+              <a:rPr lang="en-US" dirty="0" smtClean="0"/>
+              <a:t>Start: 10/17</a:t>
+            </a:r>
+          </a:p>
+          <a:p>
+            <a:pPr marL="285750" indent="-285750">
+              <a:buFont typeface="Arial" pitchFamily="34" charset="0"/>
+              <a:buChar char="•"/>
+            </a:pPr>
+            <a:r>
+              <a:rPr lang="en-US" dirty="0" smtClean="0"/>
+              <a:t>Planned: 10/30</a:t>
+            </a:r>
+          </a:p>
+          <a:p>
+            <a:pPr marL="285750" indent="-285750">
+              <a:buFont typeface="Arial" pitchFamily="34" charset="0"/>
+              <a:buChar char="•"/>
+            </a:pPr>
+            <a:r>
+              <a:rPr lang="en-US" dirty="0" smtClean="0"/>
+              <a:t>Actual: 10/30</a:t>
+            </a:r>
+            <a:endParaRPr lang="en-US" dirty="0"/>
+          </a:p>
+        </p:txBody>
+      </p:sp>
+      <p:cxnSp>
+        <p:nvCxnSpPr>
+          <p:cNvPr id="11" name="Straight Arrow Connector 10"/>
+          <p:cNvCxnSpPr>
+            <a:stCxn id="7" idx="3"/>
+            <a:endCxn id="8" idx="1"/>
+          </p:cNvCxnSpPr>
+          <p:nvPr/>
+        </p:nvCxnSpPr>
+        <p:spPr>
+          <a:xfrm>
+            <a:off x="2514600" y="5753100"/>
+            <a:ext cx="762000" cy="7034"/>
+          </a:xfrm>
+          <a:prstGeom prst="straightConnector1">
+            <a:avLst/>
+          </a:prstGeom>
+          <a:ln>
+            <a:tailEnd type="arrow"/>
+          </a:ln>
+        </p:spPr>
+        <p:style>
+          <a:lnRef idx="1">
+            <a:schemeClr val="accent1"/>
+          </a:lnRef>
+          <a:fillRef idx="0">
+            <a:schemeClr val="accent1"/>
+          </a:fillRef>
+          <a:effectRef idx="0">
+            <a:schemeClr val="accent1"/>
+          </a:effectRef>
+          <a:fontRef idx="minor">
+            <a:schemeClr val="tx1"/>
+          </a:fontRef>
+        </p:style>
+      </p:cxnSp>
+      <p:cxnSp>
+        <p:nvCxnSpPr>
+          <p:cNvPr id="13" name="Straight Arrow Connector 12"/>
+          <p:cNvCxnSpPr>
+            <a:stCxn id="8" idx="0"/>
+            <a:endCxn id="4" idx="2"/>
+          </p:cNvCxnSpPr>
+          <p:nvPr/>
+        </p:nvCxnSpPr>
+        <p:spPr>
+          <a:xfrm flipH="1" flipV="1">
+            <a:off x="4338711" y="4572000"/>
+            <a:ext cx="4689" cy="464234"/>
+          </a:xfrm>
+          <a:prstGeom prst="straightConnector1">
+            <a:avLst/>
+          </a:prstGeom>
+          <a:ln>
+            <a:tailEnd type="arrow"/>
+          </a:ln>
+        </p:spPr>
+        <p:style>
+          <a:lnRef idx="1">
+            <a:schemeClr val="accent1"/>
+          </a:lnRef>
+          <a:fillRef idx="0">
+            <a:schemeClr val="accent1"/>
+          </a:fillRef>
+          <a:effectRef idx="0">
+            <a:schemeClr val="accent1"/>
+          </a:effectRef>
+          <a:fontRef idx="minor">
+            <a:schemeClr val="tx1"/>
+          </a:fontRef>
+        </p:style>
+      </p:cxnSp>
+      <p:cxnSp>
+        <p:nvCxnSpPr>
+          <p:cNvPr id="15" name="Straight Arrow Connector 14"/>
+          <p:cNvCxnSpPr>
+            <a:stCxn id="4" idx="3"/>
+            <a:endCxn id="9" idx="1"/>
+          </p:cNvCxnSpPr>
+          <p:nvPr/>
+        </p:nvCxnSpPr>
+        <p:spPr>
+          <a:xfrm>
+            <a:off x="5405511" y="3848100"/>
+            <a:ext cx="614289" cy="0"/>
+          </a:xfrm>
+          <a:prstGeom prst="straightConnector1">
+            <a:avLst/>
+          </a:prstGeom>
+          <a:ln>
+            <a:tailEnd type="arrow"/>
+          </a:ln>
+        </p:spPr>
+        <p:style>
+          <a:lnRef idx="1">
+            <a:schemeClr val="accent1"/>
+          </a:lnRef>
+          <a:fillRef idx="0">
+            <a:schemeClr val="accent1"/>
+          </a:fillRef>
+          <a:effectRef idx="0">
+            <a:schemeClr val="accent1"/>
+          </a:effectRef>
+          <a:fontRef idx="minor">
+            <a:schemeClr val="tx1"/>
+          </a:fontRef>
+        </p:style>
+      </p:cxnSp>
+      <p:cxnSp>
+        <p:nvCxnSpPr>
+          <p:cNvPr id="17" name="Straight Arrow Connector 16"/>
+          <p:cNvCxnSpPr>
+            <a:stCxn id="2" idx="2"/>
+          </p:cNvCxnSpPr>
+          <p:nvPr/>
+        </p:nvCxnSpPr>
+        <p:spPr>
+          <a:xfrm>
+            <a:off x="1333500" y="1828800"/>
+            <a:ext cx="4686300" cy="1295400"/>
+          </a:xfrm>
+          <a:prstGeom prst="straightConnector1">
+            <a:avLst/>
+          </a:prstGeom>
+          <a:ln>
+            <a:tailEnd type="arrow"/>
+          </a:ln>
+        </p:spPr>
+        <p:style>
+          <a:lnRef idx="1">
+            <a:schemeClr val="accent1"/>
+          </a:lnRef>
+          <a:fillRef idx="0">
+            <a:schemeClr val="accent1"/>
+          </a:fillRef>
+          <a:effectRef idx="0">
+            <a:schemeClr val="accent1"/>
+          </a:effectRef>
+          <a:fontRef idx="minor">
+            <a:schemeClr val="tx1"/>
+          </a:fontRef>
+        </p:style>
+      </p:cxnSp>
+      <p:cxnSp>
+        <p:nvCxnSpPr>
+          <p:cNvPr id="19" name="Straight Arrow Connector 18"/>
+          <p:cNvCxnSpPr>
+            <a:stCxn id="5" idx="2"/>
+          </p:cNvCxnSpPr>
+          <p:nvPr/>
+        </p:nvCxnSpPr>
+        <p:spPr>
+          <a:xfrm>
+            <a:off x="3470617" y="1828800"/>
+            <a:ext cx="2549183" cy="1295400"/>
+          </a:xfrm>
+          <a:prstGeom prst="straightConnector1">
+            <a:avLst/>
+          </a:prstGeom>
+          <a:ln>
+            <a:tailEnd type="arrow"/>
+          </a:ln>
+        </p:spPr>
+        <p:style>
+          <a:lnRef idx="1">
+            <a:schemeClr val="accent1"/>
+          </a:lnRef>
+          <a:fillRef idx="0">
+            <a:schemeClr val="accent1"/>
+          </a:fillRef>
+          <a:effectRef idx="0">
+            <a:schemeClr val="accent1"/>
+          </a:effectRef>
+          <a:fontRef idx="minor">
+            <a:schemeClr val="tx1"/>
+          </a:fontRef>
+        </p:style>
+      </p:cxnSp>
+      <p:cxnSp>
+        <p:nvCxnSpPr>
+          <p:cNvPr id="21" name="Straight Arrow Connector 20"/>
+          <p:cNvCxnSpPr>
+            <a:stCxn id="6" idx="2"/>
+            <a:endCxn id="9" idx="0"/>
+          </p:cNvCxnSpPr>
+          <p:nvPr/>
+        </p:nvCxnSpPr>
+        <p:spPr>
+          <a:xfrm>
+            <a:off x="5638800" y="1828800"/>
+            <a:ext cx="1447800" cy="1295400"/>
+          </a:xfrm>
+          <a:prstGeom prst="straightConnector1">
+            <a:avLst/>
+          </a:prstGeom>
+          <a:ln>
+            <a:tailEnd type="arrow"/>
+          </a:ln>
+        </p:spPr>
+        <p:style>
+          <a:lnRef idx="1">
+            <a:schemeClr val="accent1"/>
+          </a:lnRef>
+          <a:fillRef idx="0">
+            <a:schemeClr val="accent1"/>
+          </a:fillRef>
+          <a:effectRef idx="0">
+            <a:schemeClr val="accent1"/>
+          </a:effectRef>
+          <a:fontRef idx="minor">
+            <a:schemeClr val="tx1"/>
+          </a:fontRef>
+        </p:style>
+      </p:cxnSp>
+      <p:cxnSp>
+        <p:nvCxnSpPr>
+          <p:cNvPr id="23" name="Straight Arrow Connector 22"/>
+          <p:cNvCxnSpPr>
+            <a:stCxn id="3" idx="2"/>
+            <a:endCxn id="9" idx="0"/>
+          </p:cNvCxnSpPr>
+          <p:nvPr/>
+        </p:nvCxnSpPr>
+        <p:spPr>
+          <a:xfrm flipH="1">
+            <a:off x="7086600" y="1828800"/>
+            <a:ext cx="723900" cy="1295400"/>
+          </a:xfrm>
+          <a:prstGeom prst="straightConnector1">
+            <a:avLst/>
+          </a:prstGeom>
+          <a:ln>
+            <a:tailEnd type="arrow"/>
+          </a:ln>
+        </p:spPr>
+        <p:style>
+          <a:lnRef idx="1">
+            <a:schemeClr val="accent1"/>
+          </a:lnRef>
+          <a:fillRef idx="0">
+            <a:schemeClr val="accent1"/>
+          </a:fillRef>
+          <a:effectRef idx="0">
+            <a:schemeClr val="accent1"/>
+          </a:effectRef>
+          <a:fontRef idx="minor">
+            <a:schemeClr val="tx1"/>
+          </a:fontRef>
+        </p:style>
+      </p:cxnSp>
+      <p:sp>
+        <p:nvSpPr>
+          <p:cNvPr id="24" name="TextBox 23"/>
+          <p:cNvSpPr txBox="1"/>
+          <p:nvPr/>
+        </p:nvSpPr>
+        <p:spPr>
+          <a:xfrm>
+            <a:off x="6286500" y="5522266"/>
+            <a:ext cx="1600200" cy="461665"/>
+          </a:xfrm>
+          <a:prstGeom prst="rect">
+            <a:avLst/>
+          </a:prstGeom>
+          <a:noFill/>
+        </p:spPr>
+        <p:txBody>
+          <a:bodyPr wrap="square" rtlCol="0">
+            <a:spAutoFit/>
+          </a:bodyPr>
+          <a:lstStyle/>
+          <a:p>
+            <a:r>
+              <a:rPr lang="en-US" sz="2400" dirty="0" smtClean="0"/>
+              <a:t>Phase </a:t>
+            </a:r>
+            <a:r>
+              <a:rPr lang="en-US" sz="2400" dirty="0" smtClean="0"/>
+              <a:t>Four</a:t>
+            </a:r>
+            <a:endParaRPr lang="en-US" sz="2400" dirty="0"/>
+          </a:p>
+        </p:txBody>
+      </p:sp>
+      <p:sp>
+        <p:nvSpPr>
+          <p:cNvPr id="25" name="TextBox 24"/>
+          <p:cNvSpPr txBox="1"/>
+          <p:nvPr/>
+        </p:nvSpPr>
+        <p:spPr>
+          <a:xfrm>
+            <a:off x="381000" y="3124200"/>
+            <a:ext cx="2133600" cy="461665"/>
+          </a:xfrm>
+          <a:prstGeom prst="rect">
+            <a:avLst/>
+          </a:prstGeom>
+          <a:noFill/>
+        </p:spPr>
+        <p:txBody>
+          <a:bodyPr wrap="square" rtlCol="0">
+            <a:spAutoFit/>
+          </a:bodyPr>
+          <a:lstStyle/>
+          <a:p>
+            <a:r>
+              <a:rPr lang="en-US" sz="2400" dirty="0" smtClean="0"/>
+              <a:t>Note: MM/DD</a:t>
+            </a:r>
+            <a:endParaRPr lang="en-US" sz="2400" dirty="0"/>
+          </a:p>
+        </p:txBody>
+      </p:sp>
+    </p:spTree>
+    <p:extLst>
+      <p:ext uri="{BB962C8B-B14F-4D97-AF65-F5344CB8AC3E}">
+        <p14:creationId xmlns:p14="http://schemas.microsoft.com/office/powerpoint/2010/main" val="3626102827"/>
+      </p:ext>
+    </p:extLst>
+  </p:cSld>
+  <p:clrMapOvr>
+    <a:masterClrMapping/>
+  </p:clrMapOvr>
+</p:sld>
+</file>
+
 <file path=ppt/theme/theme1.xml><?xml version="1.0" encoding="utf-8"?>
 <a:theme xmlns:a="http://schemas.openxmlformats.org/drawingml/2006/main" name="Office Theme">
   <a:themeElements>

</xml_diff>